<commit_message>
fim lista 2 linguagens
</commit_message>
<xml_diff>
--- a/Analise/LeanUX - Case Etiel.pptx
+++ b/Analise/LeanUX - Case Etiel.pptx
@@ -104,6 +104,11 @@
       </a:defRPr>
     </a:lvl9pPr>
   </p:defaultTextStyle>
+  <p:extLst>
+    <p:ext uri="{EFAFB233-063F-42B5-8137-9DF3F51BA10A}">
+      <p15:sldGuideLst xmlns:p15="http://schemas.microsoft.com/office/powerpoint/2012/main"/>
+    </p:ext>
+  </p:extLst>
 </p:presentation>
 </file>
 
@@ -254,7 +259,7 @@
           <a:p>
             <a:fld id="{E35BB695-6A38-4189-A377-DD3D98C5E75D}" type="datetimeFigureOut">
               <a:rPr lang="pt-BR" smtClean="0"/>
-              <a:t>14/08/2022</a:t>
+              <a:t>15/08/2022</a:t>
             </a:fld>
             <a:endParaRPr lang="pt-BR"/>
           </a:p>
@@ -452,7 +457,7 @@
           <a:p>
             <a:fld id="{E35BB695-6A38-4189-A377-DD3D98C5E75D}" type="datetimeFigureOut">
               <a:rPr lang="pt-BR" smtClean="0"/>
-              <a:t>14/08/2022</a:t>
+              <a:t>15/08/2022</a:t>
             </a:fld>
             <a:endParaRPr lang="pt-BR"/>
           </a:p>
@@ -660,7 +665,7 @@
           <a:p>
             <a:fld id="{E35BB695-6A38-4189-A377-DD3D98C5E75D}" type="datetimeFigureOut">
               <a:rPr lang="pt-BR" smtClean="0"/>
-              <a:t>14/08/2022</a:t>
+              <a:t>15/08/2022</a:t>
             </a:fld>
             <a:endParaRPr lang="pt-BR"/>
           </a:p>
@@ -858,7 +863,7 @@
           <a:p>
             <a:fld id="{E35BB695-6A38-4189-A377-DD3D98C5E75D}" type="datetimeFigureOut">
               <a:rPr lang="pt-BR" smtClean="0"/>
-              <a:t>14/08/2022</a:t>
+              <a:t>15/08/2022</a:t>
             </a:fld>
             <a:endParaRPr lang="pt-BR"/>
           </a:p>
@@ -1133,7 +1138,7 @@
           <a:p>
             <a:fld id="{E35BB695-6A38-4189-A377-DD3D98C5E75D}" type="datetimeFigureOut">
               <a:rPr lang="pt-BR" smtClean="0"/>
-              <a:t>14/08/2022</a:t>
+              <a:t>15/08/2022</a:t>
             </a:fld>
             <a:endParaRPr lang="pt-BR"/>
           </a:p>
@@ -1398,7 +1403,7 @@
           <a:p>
             <a:fld id="{E35BB695-6A38-4189-A377-DD3D98C5E75D}" type="datetimeFigureOut">
               <a:rPr lang="pt-BR" smtClean="0"/>
-              <a:t>14/08/2022</a:t>
+              <a:t>15/08/2022</a:t>
             </a:fld>
             <a:endParaRPr lang="pt-BR"/>
           </a:p>
@@ -1810,7 +1815,7 @@
           <a:p>
             <a:fld id="{E35BB695-6A38-4189-A377-DD3D98C5E75D}" type="datetimeFigureOut">
               <a:rPr lang="pt-BR" smtClean="0"/>
-              <a:t>14/08/2022</a:t>
+              <a:t>15/08/2022</a:t>
             </a:fld>
             <a:endParaRPr lang="pt-BR"/>
           </a:p>
@@ -1951,7 +1956,7 @@
           <a:p>
             <a:fld id="{E35BB695-6A38-4189-A377-DD3D98C5E75D}" type="datetimeFigureOut">
               <a:rPr lang="pt-BR" smtClean="0"/>
-              <a:t>14/08/2022</a:t>
+              <a:t>15/08/2022</a:t>
             </a:fld>
             <a:endParaRPr lang="pt-BR"/>
           </a:p>
@@ -2064,7 +2069,7 @@
           <a:p>
             <a:fld id="{E35BB695-6A38-4189-A377-DD3D98C5E75D}" type="datetimeFigureOut">
               <a:rPr lang="pt-BR" smtClean="0"/>
-              <a:t>14/08/2022</a:t>
+              <a:t>15/08/2022</a:t>
             </a:fld>
             <a:endParaRPr lang="pt-BR"/>
           </a:p>
@@ -2375,7 +2380,7 @@
           <a:p>
             <a:fld id="{E35BB695-6A38-4189-A377-DD3D98C5E75D}" type="datetimeFigureOut">
               <a:rPr lang="pt-BR" smtClean="0"/>
-              <a:t>14/08/2022</a:t>
+              <a:t>15/08/2022</a:t>
             </a:fld>
             <a:endParaRPr lang="pt-BR"/>
           </a:p>
@@ -2663,7 +2668,7 @@
           <a:p>
             <a:fld id="{E35BB695-6A38-4189-A377-DD3D98C5E75D}" type="datetimeFigureOut">
               <a:rPr lang="pt-BR" smtClean="0"/>
-              <a:t>14/08/2022</a:t>
+              <a:t>15/08/2022</a:t>
             </a:fld>
             <a:endParaRPr lang="pt-BR"/>
           </a:p>
@@ -2904,7 +2909,7 @@
           <a:p>
             <a:fld id="{E35BB695-6A38-4189-A377-DD3D98C5E75D}" type="datetimeFigureOut">
               <a:rPr lang="pt-BR" smtClean="0"/>
-              <a:t>14/08/2022</a:t>
+              <a:t>15/08/2022</a:t>
             </a:fld>
             <a:endParaRPr lang="pt-BR"/>
           </a:p>
@@ -3853,7 +3858,7 @@
             <a:pPr algn="ctr"/>
             <a:r>
               <a:rPr lang="pt-BR" dirty="0"/>
-              <a:t>Setor de ordenha</a:t>
+              <a:t>Setor produção de leite</a:t>
             </a:r>
           </a:p>
         </p:txBody>
@@ -3919,7 +3924,7 @@
         </p:nvSpPr>
         <p:spPr>
           <a:xfrm>
-            <a:off x="9207843" y="627509"/>
+            <a:off x="9207845" y="3201389"/>
             <a:ext cx="1705233" cy="568406"/>
           </a:xfrm>
           <a:prstGeom prst="rect">
@@ -3966,7 +3971,7 @@
         </p:nvSpPr>
         <p:spPr>
           <a:xfrm>
-            <a:off x="8355226" y="1458711"/>
+            <a:off x="9207844" y="2182687"/>
             <a:ext cx="1705233" cy="568406"/>
           </a:xfrm>
           <a:prstGeom prst="rect">
@@ -4013,7 +4018,7 @@
         </p:nvSpPr>
         <p:spPr>
           <a:xfrm>
-            <a:off x="9539416" y="2372593"/>
+            <a:off x="9207846" y="4214829"/>
             <a:ext cx="1705233" cy="568406"/>
           </a:xfrm>
           <a:prstGeom prst="rect">
@@ -4060,8 +4065,8 @@
         </p:nvSpPr>
         <p:spPr>
           <a:xfrm>
-            <a:off x="9419967" y="3400587"/>
-            <a:ext cx="1705233" cy="568406"/>
+            <a:off x="9185189" y="1174508"/>
+            <a:ext cx="1750541" cy="568406"/>
           </a:xfrm>
           <a:prstGeom prst="rect">
             <a:avLst/>
@@ -4088,7 +4093,324 @@
             <a:pPr algn="ctr"/>
             <a:r>
               <a:rPr lang="pt-BR" dirty="0"/>
-              <a:t>??</a:t>
+              <a:t>Análises precisas e eficientes</a:t>
+            </a:r>
+          </a:p>
+        </p:txBody>
+      </p:sp>
+      <p:sp>
+        <p:nvSpPr>
+          <p:cNvPr id="2" name="Retângulo 1">
+            <a:extLst>
+              <a:ext uri="{FF2B5EF4-FFF2-40B4-BE49-F238E27FC236}">
+                <a16:creationId xmlns:a16="http://schemas.microsoft.com/office/drawing/2014/main" id="{932789F6-1062-3324-9A25-22624AEBB848}"/>
+              </a:ext>
+            </a:extLst>
+          </p:cNvPr>
+          <p:cNvSpPr/>
+          <p:nvPr/>
+        </p:nvSpPr>
+        <p:spPr>
+          <a:xfrm>
+            <a:off x="9207847" y="5228270"/>
+            <a:ext cx="1705233" cy="568406"/>
+          </a:xfrm>
+          <a:prstGeom prst="rect">
+            <a:avLst/>
+          </a:prstGeom>
+        </p:spPr>
+        <p:style>
+          <a:lnRef idx="1">
+            <a:schemeClr val="accent4"/>
+          </a:lnRef>
+          <a:fillRef idx="2">
+            <a:schemeClr val="accent4"/>
+          </a:fillRef>
+          <a:effectRef idx="1">
+            <a:schemeClr val="accent4"/>
+          </a:effectRef>
+          <a:fontRef idx="minor">
+            <a:schemeClr val="dk1"/>
+          </a:fontRef>
+        </p:style>
+        <p:txBody>
+          <a:bodyPr rtlCol="0" anchor="ctr"/>
+          <a:lstStyle/>
+          <a:p>
+            <a:pPr algn="ctr"/>
+            <a:r>
+              <a:rPr lang="pt-BR" dirty="0"/>
+              <a:t>Maior controle sobre animais</a:t>
+            </a:r>
+          </a:p>
+        </p:txBody>
+      </p:sp>
+      <p:sp>
+        <p:nvSpPr>
+          <p:cNvPr id="3" name="Retângulo 2">
+            <a:extLst>
+              <a:ext uri="{FF2B5EF4-FFF2-40B4-BE49-F238E27FC236}">
+                <a16:creationId xmlns:a16="http://schemas.microsoft.com/office/drawing/2014/main" id="{5778A07A-BA47-F184-888E-E22E26DD9EF9}"/>
+              </a:ext>
+            </a:extLst>
+          </p:cNvPr>
+          <p:cNvSpPr/>
+          <p:nvPr/>
+        </p:nvSpPr>
+        <p:spPr>
+          <a:xfrm>
+            <a:off x="4646139" y="890305"/>
+            <a:ext cx="2487829" cy="568406"/>
+          </a:xfrm>
+          <a:prstGeom prst="rect">
+            <a:avLst/>
+          </a:prstGeom>
+        </p:spPr>
+        <p:style>
+          <a:lnRef idx="1">
+            <a:schemeClr val="accent4"/>
+          </a:lnRef>
+          <a:fillRef idx="2">
+            <a:schemeClr val="accent4"/>
+          </a:fillRef>
+          <a:effectRef idx="1">
+            <a:schemeClr val="accent4"/>
+          </a:effectRef>
+          <a:fontRef idx="minor">
+            <a:schemeClr val="dk1"/>
+          </a:fontRef>
+        </p:style>
+        <p:txBody>
+          <a:bodyPr rtlCol="0" anchor="ctr"/>
+          <a:lstStyle/>
+          <a:p>
+            <a:pPr algn="ctr"/>
+            <a:r>
+              <a:rPr lang="pt-BR" dirty="0"/>
+              <a:t>Serviço web com dados da produção</a:t>
+            </a:r>
+          </a:p>
+        </p:txBody>
+      </p:sp>
+      <p:sp>
+        <p:nvSpPr>
+          <p:cNvPr id="5" name="Retângulo 4">
+            <a:extLst>
+              <a:ext uri="{FF2B5EF4-FFF2-40B4-BE49-F238E27FC236}">
+                <a16:creationId xmlns:a16="http://schemas.microsoft.com/office/drawing/2014/main" id="{F1BC6188-B57E-1C3E-590F-9FA0C8FF3232}"/>
+              </a:ext>
+            </a:extLst>
+          </p:cNvPr>
+          <p:cNvSpPr/>
+          <p:nvPr/>
+        </p:nvSpPr>
+        <p:spPr>
+          <a:xfrm>
+            <a:off x="4646139" y="1885511"/>
+            <a:ext cx="2487829" cy="568406"/>
+          </a:xfrm>
+          <a:prstGeom prst="rect">
+            <a:avLst/>
+          </a:prstGeom>
+        </p:spPr>
+        <p:style>
+          <a:lnRef idx="1">
+            <a:schemeClr val="accent4"/>
+          </a:lnRef>
+          <a:fillRef idx="2">
+            <a:schemeClr val="accent4"/>
+          </a:fillRef>
+          <a:effectRef idx="1">
+            <a:schemeClr val="accent4"/>
+          </a:effectRef>
+          <a:fontRef idx="minor">
+            <a:schemeClr val="dk1"/>
+          </a:fontRef>
+        </p:style>
+        <p:txBody>
+          <a:bodyPr rtlCol="0" anchor="ctr"/>
+          <a:lstStyle/>
+          <a:p>
+            <a:pPr algn="ctr"/>
+            <a:r>
+              <a:rPr lang="pt-BR" dirty="0"/>
+              <a:t>Dados recuperados da ordenha via webservice</a:t>
+            </a:r>
+          </a:p>
+        </p:txBody>
+      </p:sp>
+      <p:sp>
+        <p:nvSpPr>
+          <p:cNvPr id="8" name="Retângulo 7">
+            <a:extLst>
+              <a:ext uri="{FF2B5EF4-FFF2-40B4-BE49-F238E27FC236}">
+                <a16:creationId xmlns:a16="http://schemas.microsoft.com/office/drawing/2014/main" id="{B86B908C-D4B6-6162-414F-4049D56AD28B}"/>
+              </a:ext>
+            </a:extLst>
+          </p:cNvPr>
+          <p:cNvSpPr/>
+          <p:nvPr/>
+        </p:nvSpPr>
+        <p:spPr>
+          <a:xfrm>
+            <a:off x="4646139" y="2908516"/>
+            <a:ext cx="2487829" cy="568406"/>
+          </a:xfrm>
+          <a:prstGeom prst="rect">
+            <a:avLst/>
+          </a:prstGeom>
+        </p:spPr>
+        <p:style>
+          <a:lnRef idx="1">
+            <a:schemeClr val="accent4"/>
+          </a:lnRef>
+          <a:fillRef idx="2">
+            <a:schemeClr val="accent4"/>
+          </a:fillRef>
+          <a:effectRef idx="1">
+            <a:schemeClr val="accent4"/>
+          </a:effectRef>
+          <a:fontRef idx="minor">
+            <a:schemeClr val="dk1"/>
+          </a:fontRef>
+        </p:style>
+        <p:txBody>
+          <a:bodyPr rtlCol="0" anchor="ctr"/>
+          <a:lstStyle/>
+          <a:p>
+            <a:pPr algn="ctr"/>
+            <a:r>
+              <a:rPr lang="pt-BR" dirty="0"/>
+              <a:t>Históricos e gráficos de dados da produção</a:t>
+            </a:r>
+          </a:p>
+        </p:txBody>
+      </p:sp>
+      <p:sp>
+        <p:nvSpPr>
+          <p:cNvPr id="17" name="Retângulo 16">
+            <a:extLst>
+              <a:ext uri="{FF2B5EF4-FFF2-40B4-BE49-F238E27FC236}">
+                <a16:creationId xmlns:a16="http://schemas.microsoft.com/office/drawing/2014/main" id="{D38BA044-71A9-B30D-CCDB-2E49241B19AD}"/>
+              </a:ext>
+            </a:extLst>
+          </p:cNvPr>
+          <p:cNvSpPr/>
+          <p:nvPr/>
+        </p:nvSpPr>
+        <p:spPr>
+          <a:xfrm>
+            <a:off x="4646138" y="3859164"/>
+            <a:ext cx="2487829" cy="866147"/>
+          </a:xfrm>
+          <a:prstGeom prst="rect">
+            <a:avLst/>
+          </a:prstGeom>
+        </p:spPr>
+        <p:style>
+          <a:lnRef idx="1">
+            <a:schemeClr val="accent4"/>
+          </a:lnRef>
+          <a:fillRef idx="2">
+            <a:schemeClr val="accent4"/>
+          </a:fillRef>
+          <a:effectRef idx="1">
+            <a:schemeClr val="accent4"/>
+          </a:effectRef>
+          <a:fontRef idx="minor">
+            <a:schemeClr val="dk1"/>
+          </a:fontRef>
+        </p:style>
+        <p:txBody>
+          <a:bodyPr rtlCol="0" anchor="ctr"/>
+          <a:lstStyle/>
+          <a:p>
+            <a:pPr algn="ctr"/>
+            <a:r>
+              <a:rPr lang="pt-BR" dirty="0"/>
+              <a:t>Telas personalizadas para cada perfil de usuário</a:t>
+            </a:r>
+          </a:p>
+        </p:txBody>
+      </p:sp>
+      <p:sp>
+        <p:nvSpPr>
+          <p:cNvPr id="21" name="CaixaDeTexto 20">
+            <a:extLst>
+              <a:ext uri="{FF2B5EF4-FFF2-40B4-BE49-F238E27FC236}">
+                <a16:creationId xmlns:a16="http://schemas.microsoft.com/office/drawing/2014/main" id="{0234358C-D096-6B17-9B65-22BFE8A0361A}"/>
+              </a:ext>
+            </a:extLst>
+          </p:cNvPr>
+          <p:cNvSpPr txBox="1"/>
+          <p:nvPr/>
+        </p:nvSpPr>
+        <p:spPr>
+          <a:xfrm>
+            <a:off x="3865605" y="6356719"/>
+            <a:ext cx="4158043" cy="338554"/>
+          </a:xfrm>
+          <a:prstGeom prst="rect">
+            <a:avLst/>
+          </a:prstGeom>
+          <a:noFill/>
+        </p:spPr>
+        <p:txBody>
+          <a:bodyPr wrap="square" rtlCol="0">
+            <a:spAutoFit/>
+          </a:bodyPr>
+          <a:lstStyle/>
+          <a:p>
+            <a:r>
+              <a:rPr lang="pt-BR" sz="1600" b="1" dirty="0"/>
+              <a:t>Nome: Danylo Dias Gomes RA: 02221004</a:t>
+            </a:r>
+          </a:p>
+        </p:txBody>
+      </p:sp>
+      <p:sp>
+        <p:nvSpPr>
+          <p:cNvPr id="26" name="Retângulo 25">
+            <a:extLst>
+              <a:ext uri="{FF2B5EF4-FFF2-40B4-BE49-F238E27FC236}">
+                <a16:creationId xmlns:a16="http://schemas.microsoft.com/office/drawing/2014/main" id="{8503BE9B-5C47-DC42-CD63-EA4B52E4411B}"/>
+              </a:ext>
+            </a:extLst>
+          </p:cNvPr>
+          <p:cNvSpPr/>
+          <p:nvPr/>
+        </p:nvSpPr>
+        <p:spPr>
+          <a:xfrm>
+            <a:off x="4646138" y="5106234"/>
+            <a:ext cx="2487829" cy="863212"/>
+          </a:xfrm>
+          <a:prstGeom prst="rect">
+            <a:avLst/>
+          </a:prstGeom>
+        </p:spPr>
+        <p:style>
+          <a:lnRef idx="1">
+            <a:schemeClr val="accent4"/>
+          </a:lnRef>
+          <a:fillRef idx="2">
+            <a:schemeClr val="accent4"/>
+          </a:fillRef>
+          <a:effectRef idx="1">
+            <a:schemeClr val="accent4"/>
+          </a:effectRef>
+          <a:fontRef idx="minor">
+            <a:schemeClr val="dk1"/>
+          </a:fontRef>
+        </p:style>
+        <p:txBody>
+          <a:bodyPr rtlCol="0" anchor="ctr"/>
+          <a:lstStyle/>
+          <a:p>
+            <a:pPr algn="ctr"/>
+            <a:r>
+              <a:rPr lang="pt-BR" dirty="0"/>
+              <a:t>Controle das vacas e suas condições na ordenha</a:t>
             </a:r>
           </a:p>
         </p:txBody>

</xml_diff>